<commit_message>
Final touchups and report
</commit_message>
<xml_diff>
--- a/docs/Uber Eats.pptx
+++ b/docs/Uber Eats.pptx
@@ -9,13 +9,14 @@
     <p:sldId id="257" r:id="rId3"/>
     <p:sldId id="258" r:id="rId4"/>
     <p:sldId id="259" r:id="rId5"/>
-    <p:sldId id="260" r:id="rId6"/>
-    <p:sldId id="261" r:id="rId7"/>
+    <p:sldId id="261" r:id="rId6"/>
+    <p:sldId id="260" r:id="rId7"/>
     <p:sldId id="262" r:id="rId8"/>
     <p:sldId id="263" r:id="rId9"/>
-    <p:sldId id="265" r:id="rId10"/>
-    <p:sldId id="264" r:id="rId11"/>
-    <p:sldId id="266" r:id="rId12"/>
+    <p:sldId id="267" r:id="rId10"/>
+    <p:sldId id="265" r:id="rId11"/>
+    <p:sldId id="264" r:id="rId12"/>
+    <p:sldId id="266" r:id="rId13"/>
   </p:sldIdLst>
   <p:sldSz cx="12192000" cy="6858000"/>
   <p:notesSz cx="6858000" cy="9144000"/>
@@ -315,7 +316,7 @@
           <a:p>
             <a:fld id="{858D686B-D4D6-461E-B319-AAD4B95859DF}" type="datetimeFigureOut">
               <a:rPr lang="pt-PT" smtClean="0"/>
-              <a:t>15/05/2022</a:t>
+              <a:t>16/05/2022</a:t>
             </a:fld>
             <a:endParaRPr lang="pt-PT" dirty="0"/>
           </a:p>
@@ -357,7 +358,7 @@
           <a:p>
             <a:fld id="{CECF0AB5-50A3-476D-8DCD-80FF577EBBB5}" type="slidenum">
               <a:rPr lang="pt-PT" smtClean="0"/>
-              <a:t>‹nº›</a:t>
+              <a:t>‹#›</a:t>
             </a:fld>
             <a:endParaRPr lang="pt-PT" dirty="0"/>
           </a:p>
@@ -613,7 +614,7 @@
           <a:p>
             <a:fld id="{858D686B-D4D6-461E-B319-AAD4B95859DF}" type="datetimeFigureOut">
               <a:rPr lang="pt-PT" smtClean="0"/>
-              <a:t>15/05/2022</a:t>
+              <a:t>16/05/2022</a:t>
             </a:fld>
             <a:endParaRPr lang="pt-PT" dirty="0"/>
           </a:p>
@@ -655,7 +656,7 @@
           <a:p>
             <a:fld id="{CECF0AB5-50A3-476D-8DCD-80FF577EBBB5}" type="slidenum">
               <a:rPr lang="pt-PT" smtClean="0"/>
-              <a:t>‹nº›</a:t>
+              <a:t>‹#›</a:t>
             </a:fld>
             <a:endParaRPr lang="pt-PT" dirty="0"/>
           </a:p>
@@ -805,7 +806,7 @@
           <a:p>
             <a:fld id="{858D686B-D4D6-461E-B319-AAD4B95859DF}" type="datetimeFigureOut">
               <a:rPr lang="pt-PT" smtClean="0"/>
-              <a:t>15/05/2022</a:t>
+              <a:t>16/05/2022</a:t>
             </a:fld>
             <a:endParaRPr lang="pt-PT" dirty="0"/>
           </a:p>
@@ -847,7 +848,7 @@
           <a:p>
             <a:fld id="{CECF0AB5-50A3-476D-8DCD-80FF577EBBB5}" type="slidenum">
               <a:rPr lang="pt-PT" smtClean="0"/>
-              <a:t>‹nº›</a:t>
+              <a:t>‹#›</a:t>
             </a:fld>
             <a:endParaRPr lang="pt-PT" dirty="0"/>
           </a:p>
@@ -1066,7 +1067,7 @@
           <a:p>
             <a:fld id="{858D686B-D4D6-461E-B319-AAD4B95859DF}" type="datetimeFigureOut">
               <a:rPr lang="pt-PT" smtClean="0"/>
-              <a:t>15/05/2022</a:t>
+              <a:t>16/05/2022</a:t>
             </a:fld>
             <a:endParaRPr lang="pt-PT" dirty="0"/>
           </a:p>
@@ -1108,7 +1109,7 @@
           <a:p>
             <a:fld id="{CECF0AB5-50A3-476D-8DCD-80FF577EBBB5}" type="slidenum">
               <a:rPr lang="pt-PT" smtClean="0"/>
-              <a:t>‹nº›</a:t>
+              <a:t>‹#›</a:t>
             </a:fld>
             <a:endParaRPr lang="pt-PT" dirty="0"/>
           </a:p>
@@ -1490,7 +1491,7 @@
           <a:p>
             <a:fld id="{858D686B-D4D6-461E-B319-AAD4B95859DF}" type="datetimeFigureOut">
               <a:rPr lang="pt-PT" smtClean="0"/>
-              <a:t>15/05/2022</a:t>
+              <a:t>16/05/2022</a:t>
             </a:fld>
             <a:endParaRPr lang="pt-PT" dirty="0"/>
           </a:p>
@@ -1532,7 +1533,7 @@
           <a:p>
             <a:fld id="{CECF0AB5-50A3-476D-8DCD-80FF577EBBB5}" type="slidenum">
               <a:rPr lang="pt-PT" smtClean="0"/>
-              <a:t>‹nº›</a:t>
+              <a:t>‹#›</a:t>
             </a:fld>
             <a:endParaRPr lang="pt-PT" dirty="0"/>
           </a:p>
@@ -2027,7 +2028,7 @@
           <a:p>
             <a:fld id="{858D686B-D4D6-461E-B319-AAD4B95859DF}" type="datetimeFigureOut">
               <a:rPr lang="pt-PT" smtClean="0"/>
-              <a:t>15/05/2022</a:t>
+              <a:t>16/05/2022</a:t>
             </a:fld>
             <a:endParaRPr lang="pt-PT" dirty="0"/>
           </a:p>
@@ -2069,7 +2070,7 @@
           <a:p>
             <a:fld id="{CECF0AB5-50A3-476D-8DCD-80FF577EBBB5}" type="slidenum">
               <a:rPr lang="pt-PT" smtClean="0"/>
-              <a:t>‹nº›</a:t>
+              <a:t>‹#›</a:t>
             </a:fld>
             <a:endParaRPr lang="pt-PT" dirty="0"/>
           </a:p>
@@ -2891,7 +2892,7 @@
           <a:p>
             <a:fld id="{858D686B-D4D6-461E-B319-AAD4B95859DF}" type="datetimeFigureOut">
               <a:rPr lang="pt-PT" smtClean="0"/>
-              <a:t>15/05/2022</a:t>
+              <a:t>16/05/2022</a:t>
             </a:fld>
             <a:endParaRPr lang="pt-PT" dirty="0"/>
           </a:p>
@@ -2933,7 +2934,7 @@
           <a:p>
             <a:fld id="{CECF0AB5-50A3-476D-8DCD-80FF577EBBB5}" type="slidenum">
               <a:rPr lang="pt-PT" smtClean="0"/>
-              <a:t>‹nº›</a:t>
+              <a:t>‹#›</a:t>
             </a:fld>
             <a:endParaRPr lang="pt-PT" dirty="0"/>
           </a:p>
@@ -3061,7 +3062,7 @@
           <a:p>
             <a:fld id="{858D686B-D4D6-461E-B319-AAD4B95859DF}" type="datetimeFigureOut">
               <a:rPr lang="pt-PT" smtClean="0"/>
-              <a:t>15/05/2022</a:t>
+              <a:t>16/05/2022</a:t>
             </a:fld>
             <a:endParaRPr lang="pt-PT" dirty="0"/>
           </a:p>
@@ -3103,7 +3104,7 @@
           <a:p>
             <a:fld id="{CECF0AB5-50A3-476D-8DCD-80FF577EBBB5}" type="slidenum">
               <a:rPr lang="pt-PT" smtClean="0"/>
-              <a:t>‹nº›</a:t>
+              <a:t>‹#›</a:t>
             </a:fld>
             <a:endParaRPr lang="pt-PT" dirty="0"/>
           </a:p>
@@ -3245,7 +3246,7 @@
           <a:p>
             <a:fld id="{858D686B-D4D6-461E-B319-AAD4B95859DF}" type="datetimeFigureOut">
               <a:rPr lang="pt-PT" smtClean="0"/>
-              <a:t>15/05/2022</a:t>
+              <a:t>16/05/2022</a:t>
             </a:fld>
             <a:endParaRPr lang="pt-PT" dirty="0"/>
           </a:p>
@@ -3287,7 +3288,7 @@
           <a:p>
             <a:fld id="{CECF0AB5-50A3-476D-8DCD-80FF577EBBB5}" type="slidenum">
               <a:rPr lang="pt-PT" smtClean="0"/>
-              <a:t>‹nº›</a:t>
+              <a:t>‹#›</a:t>
             </a:fld>
             <a:endParaRPr lang="pt-PT" dirty="0"/>
           </a:p>
@@ -3415,7 +3416,7 @@
           <a:p>
             <a:fld id="{858D686B-D4D6-461E-B319-AAD4B95859DF}" type="datetimeFigureOut">
               <a:rPr lang="pt-PT" smtClean="0"/>
-              <a:t>15/05/2022</a:t>
+              <a:t>16/05/2022</a:t>
             </a:fld>
             <a:endParaRPr lang="pt-PT" dirty="0"/>
           </a:p>
@@ -3457,7 +3458,7 @@
           <a:p>
             <a:fld id="{CECF0AB5-50A3-476D-8DCD-80FF577EBBB5}" type="slidenum">
               <a:rPr lang="pt-PT" smtClean="0"/>
-              <a:t>‹nº›</a:t>
+              <a:t>‹#›</a:t>
             </a:fld>
             <a:endParaRPr lang="pt-PT" dirty="0"/>
           </a:p>
@@ -3659,7 +3660,7 @@
           <a:p>
             <a:fld id="{858D686B-D4D6-461E-B319-AAD4B95859DF}" type="datetimeFigureOut">
               <a:rPr lang="pt-PT" smtClean="0"/>
-              <a:t>15/05/2022</a:t>
+              <a:t>16/05/2022</a:t>
             </a:fld>
             <a:endParaRPr lang="pt-PT" dirty="0"/>
           </a:p>
@@ -3701,7 +3702,7 @@
           <a:p>
             <a:fld id="{CECF0AB5-50A3-476D-8DCD-80FF577EBBB5}" type="slidenum">
               <a:rPr lang="pt-PT" smtClean="0"/>
-              <a:t>‹nº›</a:t>
+              <a:t>‹#›</a:t>
             </a:fld>
             <a:endParaRPr lang="pt-PT" dirty="0"/>
           </a:p>
@@ -3895,7 +3896,7 @@
           <a:p>
             <a:fld id="{858D686B-D4D6-461E-B319-AAD4B95859DF}" type="datetimeFigureOut">
               <a:rPr lang="pt-PT" smtClean="0"/>
-              <a:t>15/05/2022</a:t>
+              <a:t>16/05/2022</a:t>
             </a:fld>
             <a:endParaRPr lang="pt-PT" dirty="0"/>
           </a:p>
@@ -3937,7 +3938,7 @@
           <a:p>
             <a:fld id="{CECF0AB5-50A3-476D-8DCD-80FF577EBBB5}" type="slidenum">
               <a:rPr lang="pt-PT" smtClean="0"/>
-              <a:t>‹nº›</a:t>
+              <a:t>‹#›</a:t>
             </a:fld>
             <a:endParaRPr lang="pt-PT" dirty="0"/>
           </a:p>
@@ -4361,7 +4362,7 @@
           <a:p>
             <a:fld id="{858D686B-D4D6-461E-B319-AAD4B95859DF}" type="datetimeFigureOut">
               <a:rPr lang="pt-PT" smtClean="0"/>
-              <a:t>15/05/2022</a:t>
+              <a:t>16/05/2022</a:t>
             </a:fld>
             <a:endParaRPr lang="pt-PT" dirty="0"/>
           </a:p>
@@ -4403,7 +4404,7 @@
           <a:p>
             <a:fld id="{CECF0AB5-50A3-476D-8DCD-80FF577EBBB5}" type="slidenum">
               <a:rPr lang="pt-PT" smtClean="0"/>
-              <a:t>‹nº›</a:t>
+              <a:t>‹#›</a:t>
             </a:fld>
             <a:endParaRPr lang="pt-PT" dirty="0"/>
           </a:p>
@@ -4479,7 +4480,7 @@
           <a:p>
             <a:fld id="{858D686B-D4D6-461E-B319-AAD4B95859DF}" type="datetimeFigureOut">
               <a:rPr lang="pt-PT" smtClean="0"/>
-              <a:t>15/05/2022</a:t>
+              <a:t>16/05/2022</a:t>
             </a:fld>
             <a:endParaRPr lang="pt-PT" dirty="0"/>
           </a:p>
@@ -4521,7 +4522,7 @@
           <a:p>
             <a:fld id="{CECF0AB5-50A3-476D-8DCD-80FF577EBBB5}" type="slidenum">
               <a:rPr lang="pt-PT" smtClean="0"/>
-              <a:t>‹nº›</a:t>
+              <a:t>‹#›</a:t>
             </a:fld>
             <a:endParaRPr lang="pt-PT" dirty="0"/>
           </a:p>
@@ -4574,7 +4575,7 @@
           <a:p>
             <a:fld id="{858D686B-D4D6-461E-B319-AAD4B95859DF}" type="datetimeFigureOut">
               <a:rPr lang="pt-PT" smtClean="0"/>
-              <a:t>15/05/2022</a:t>
+              <a:t>16/05/2022</a:t>
             </a:fld>
             <a:endParaRPr lang="pt-PT" dirty="0"/>
           </a:p>
@@ -4616,7 +4617,7 @@
           <a:p>
             <a:fld id="{CECF0AB5-50A3-476D-8DCD-80FF577EBBB5}" type="slidenum">
               <a:rPr lang="pt-PT" smtClean="0"/>
-              <a:t>‹nº›</a:t>
+              <a:t>‹#›</a:t>
             </a:fld>
             <a:endParaRPr lang="pt-PT" dirty="0"/>
           </a:p>
@@ -4829,7 +4830,7 @@
           <a:p>
             <a:fld id="{858D686B-D4D6-461E-B319-AAD4B95859DF}" type="datetimeFigureOut">
               <a:rPr lang="pt-PT" smtClean="0"/>
-              <a:t>15/05/2022</a:t>
+              <a:t>16/05/2022</a:t>
             </a:fld>
             <a:endParaRPr lang="pt-PT" dirty="0"/>
           </a:p>
@@ -4871,7 +4872,7 @@
           <a:p>
             <a:fld id="{CECF0AB5-50A3-476D-8DCD-80FF577EBBB5}" type="slidenum">
               <a:rPr lang="pt-PT" smtClean="0"/>
-              <a:t>‹nº›</a:t>
+              <a:t>‹#›</a:t>
             </a:fld>
             <a:endParaRPr lang="pt-PT" dirty="0"/>
           </a:p>
@@ -5129,7 +5130,7 @@
           <a:p>
             <a:fld id="{858D686B-D4D6-461E-B319-AAD4B95859DF}" type="datetimeFigureOut">
               <a:rPr lang="pt-PT" smtClean="0"/>
-              <a:t>15/05/2022</a:t>
+              <a:t>16/05/2022</a:t>
             </a:fld>
             <a:endParaRPr lang="pt-PT" dirty="0"/>
           </a:p>
@@ -5171,7 +5172,7 @@
           <a:p>
             <a:fld id="{CECF0AB5-50A3-476D-8DCD-80FF577EBBB5}" type="slidenum">
               <a:rPr lang="pt-PT" smtClean="0"/>
-              <a:t>‹nº›</a:t>
+              <a:t>‹#›</a:t>
             </a:fld>
             <a:endParaRPr lang="pt-PT" dirty="0"/>
           </a:p>
@@ -5363,7 +5364,7 @@
           <a:p>
             <a:fld id="{858D686B-D4D6-461E-B319-AAD4B95859DF}" type="datetimeFigureOut">
               <a:rPr lang="pt-PT" smtClean="0"/>
-              <a:t>15/05/2022</a:t>
+              <a:t>16/05/2022</a:t>
             </a:fld>
             <a:endParaRPr lang="pt-PT" dirty="0"/>
           </a:p>
@@ -5455,7 +5456,7 @@
           <a:p>
             <a:fld id="{CECF0AB5-50A3-476D-8DCD-80FF577EBBB5}" type="slidenum">
               <a:rPr lang="pt-PT" smtClean="0"/>
-              <a:t>‹nº›</a:t>
+              <a:t>‹#›</a:t>
             </a:fld>
             <a:endParaRPr lang="pt-PT" dirty="0"/>
           </a:p>
@@ -6103,13 +6104,8 @@
           <a:p>
             <a:r>
               <a:rPr lang="pt-PT" dirty="0"/>
-              <a:t>Pedro Coelho - </a:t>
-            </a:r>
-            <a:r>
-              <a:rPr lang="pt-PT" dirty="0" err="1"/>
-              <a:t>upxxxxxxxxx</a:t>
-            </a:r>
-            <a:endParaRPr lang="pt-PT" dirty="0"/>
+              <a:t>Pedro Coelho – up201806802</a:t>
+            </a:r>
           </a:p>
         </p:txBody>
       </p:sp>
@@ -6148,6 +6144,90 @@
           <p:cNvPr id="2" name="Título 1">
             <a:extLst>
               <a:ext uri="{FF2B5EF4-FFF2-40B4-BE49-F238E27FC236}">
+                <a16:creationId xmlns:a16="http://schemas.microsoft.com/office/drawing/2014/main" id="{AD03724B-A5A5-47BA-9698-32F08F41B050}"/>
+              </a:ext>
+            </a:extLst>
+          </p:cNvPr>
+          <p:cNvSpPr>
+            <a:spLocks noGrp="1"/>
+          </p:cNvSpPr>
+          <p:nvPr>
+            <p:ph type="ctrTitle"/>
+          </p:nvPr>
+        </p:nvSpPr>
+        <p:spPr/>
+        <p:txBody>
+          <a:bodyPr/>
+          <a:lstStyle/>
+          <a:p>
+            <a:r>
+              <a:rPr lang="pt-PT" dirty="0"/>
+              <a:t>Adicional Slides</a:t>
+            </a:r>
+            <a:endParaRPr lang="en-US" dirty="0"/>
+          </a:p>
+        </p:txBody>
+      </p:sp>
+      <p:sp>
+        <p:nvSpPr>
+          <p:cNvPr id="5" name="Subtítulo 4">
+            <a:extLst>
+              <a:ext uri="{FF2B5EF4-FFF2-40B4-BE49-F238E27FC236}">
+                <a16:creationId xmlns:a16="http://schemas.microsoft.com/office/drawing/2014/main" id="{7BE033C7-9916-4847-A559-15F19ABC4319}"/>
+              </a:ext>
+            </a:extLst>
+          </p:cNvPr>
+          <p:cNvSpPr>
+            <a:spLocks noGrp="1"/>
+          </p:cNvSpPr>
+          <p:nvPr>
+            <p:ph type="subTitle" idx="1"/>
+          </p:nvPr>
+        </p:nvSpPr>
+        <p:spPr/>
+        <p:txBody>
+          <a:bodyPr/>
+          <a:lstStyle/>
+          <a:p>
+            <a:endParaRPr lang="en-US"/>
+          </a:p>
+        </p:txBody>
+      </p:sp>
+    </p:spTree>
+    <p:extLst>
+      <p:ext uri="{BB962C8B-B14F-4D97-AF65-F5344CB8AC3E}">
+        <p14:creationId xmlns:p14="http://schemas.microsoft.com/office/powerpoint/2010/main" val="3970367541"/>
+      </p:ext>
+    </p:extLst>
+  </p:cSld>
+  <p:clrMapOvr>
+    <a:masterClrMapping/>
+  </p:clrMapOvr>
+</p:sld>
+</file>
+
+<file path=ppt/slides/slide11.xml><?xml version="1.0" encoding="utf-8"?>
+<p:sld xmlns:a="http://schemas.openxmlformats.org/drawingml/2006/main" xmlns:r="http://schemas.openxmlformats.org/officeDocument/2006/relationships" xmlns:p="http://schemas.openxmlformats.org/presentationml/2006/main">
+  <p:cSld>
+    <p:spTree>
+      <p:nvGrpSpPr>
+        <p:cNvPr id="1" name=""/>
+        <p:cNvGrpSpPr/>
+        <p:nvPr/>
+      </p:nvGrpSpPr>
+      <p:grpSpPr>
+        <a:xfrm>
+          <a:off x="0" y="0"/>
+          <a:ext cx="0" cy="0"/>
+          <a:chOff x="0" y="0"/>
+          <a:chExt cx="0" cy="0"/>
+        </a:xfrm>
+      </p:grpSpPr>
+      <p:sp>
+        <p:nvSpPr>
+          <p:cNvPr id="2" name="Título 1">
+            <a:extLst>
+              <a:ext uri="{FF2B5EF4-FFF2-40B4-BE49-F238E27FC236}">
                 <a16:creationId xmlns:a16="http://schemas.microsoft.com/office/drawing/2014/main" id="{085B0C87-8DFC-454D-9C7A-FF27D8642CC4}"/>
               </a:ext>
             </a:extLst>
@@ -6209,7 +6289,7 @@
 </p:sld>
 </file>
 
-<file path=ppt/slides/slide11.xml><?xml version="1.0" encoding="utf-8"?>
+<file path=ppt/slides/slide12.xml><?xml version="1.0" encoding="utf-8"?>
 <p:sld xmlns:a="http://schemas.openxmlformats.org/drawingml/2006/main" xmlns:r="http://schemas.openxmlformats.org/officeDocument/2006/relationships" xmlns:p="http://schemas.openxmlformats.org/presentationml/2006/main">
   <p:cSld>
     <p:spTree>
@@ -6646,7 +6726,7 @@
             </a:r>
             <a:r>
               <a:rPr lang="pt-PT" dirty="0" err="1"/>
-              <a:t>beeing</a:t>
+              <a:t>being</a:t>
             </a:r>
             <a:r>
               <a:rPr lang="pt-PT" dirty="0"/>
@@ -6901,31 +6981,6 @@
       </p:sp>
       <p:sp>
         <p:nvSpPr>
-          <p:cNvPr id="3" name="Marcador de Posição de Conteúdo 2">
-            <a:extLst>
-              <a:ext uri="{FF2B5EF4-FFF2-40B4-BE49-F238E27FC236}">
-                <a16:creationId xmlns:a16="http://schemas.microsoft.com/office/drawing/2014/main" id="{A0385EED-DCE1-4C7F-A2C2-6E71CD4CC66F}"/>
-              </a:ext>
-            </a:extLst>
-          </p:cNvPr>
-          <p:cNvSpPr>
-            <a:spLocks noGrp="1"/>
-          </p:cNvSpPr>
-          <p:nvPr>
-            <p:ph idx="1"/>
-          </p:nvPr>
-        </p:nvSpPr>
-        <p:spPr/>
-        <p:txBody>
-          <a:bodyPr/>
-          <a:lstStyle/>
-          <a:p>
-            <a:endParaRPr lang="en-US" dirty="0"/>
-          </a:p>
-        </p:txBody>
-      </p:sp>
-      <p:sp>
-        <p:nvSpPr>
           <p:cNvPr id="4" name="Retângulo 3">
             <a:extLst>
               <a:ext uri="{FF2B5EF4-FFF2-40B4-BE49-F238E27FC236}">
@@ -7028,10 +7083,10 @@
       </p:sp>
       <p:pic>
         <p:nvPicPr>
-          <p:cNvPr id="11" name="Imagem 10">
+          <p:cNvPr id="10" name="Picture 9" descr="A picture containing diagram&#10;&#10;Description automatically generated">
             <a:extLst>
               <a:ext uri="{FF2B5EF4-FFF2-40B4-BE49-F238E27FC236}">
-                <a16:creationId xmlns:a16="http://schemas.microsoft.com/office/drawing/2014/main" id="{A4939FB7-92E8-4814-BF10-2C52E223AC96}"/>
+                <a16:creationId xmlns:a16="http://schemas.microsoft.com/office/drawing/2014/main" id="{8DAE615F-2D6D-C99B-EDAC-CC46DF903A13}"/>
               </a:ext>
             </a:extLst>
           </p:cNvPr>
@@ -7041,15 +7096,21 @@
           <p:nvPr/>
         </p:nvPicPr>
         <p:blipFill>
-          <a:blip r:embed="rId2"/>
+          <a:blip r:embed="rId2">
+            <a:extLst>
+              <a:ext uri="{28A0092B-C50C-407E-A947-70E740481C1C}">
+                <a14:useLocalDpi xmlns:a14="http://schemas.microsoft.com/office/drawing/2010/main" val="0"/>
+              </a:ext>
+            </a:extLst>
+          </a:blip>
           <a:stretch>
             <a:fillRect/>
           </a:stretch>
         </p:blipFill>
         <p:spPr>
           <a:xfrm>
-            <a:off x="1053057" y="1560456"/>
-            <a:ext cx="10329863" cy="5277950"/>
+            <a:off x="789272" y="1307507"/>
+            <a:ext cx="10857433" cy="5550493"/>
           </a:xfrm>
           <a:prstGeom prst="rect">
             <a:avLst/>
@@ -7091,7 +7152,7 @@
           <p:cNvPr id="2" name="Título 1">
             <a:extLst>
               <a:ext uri="{FF2B5EF4-FFF2-40B4-BE49-F238E27FC236}">
-                <a16:creationId xmlns:a16="http://schemas.microsoft.com/office/drawing/2014/main" id="{88AEC832-41B1-4EC0-8F45-380FECE96D8C}"/>
+                <a16:creationId xmlns:a16="http://schemas.microsoft.com/office/drawing/2014/main" id="{D7127988-9B29-43C4-8E1D-69A8FB733F6A}"/>
               </a:ext>
             </a:extLst>
           </p:cNvPr>
@@ -7109,7 +7170,7 @@
           <a:p>
             <a:r>
               <a:rPr lang="en-US" dirty="0"/>
-              <a:t>Strategies</a:t>
+              <a:t>Agent Creation </a:t>
             </a:r>
           </a:p>
         </p:txBody>
@@ -7119,7 +7180,7 @@
           <p:cNvPr id="3" name="Marcador de Posição de Conteúdo 2">
             <a:extLst>
               <a:ext uri="{FF2B5EF4-FFF2-40B4-BE49-F238E27FC236}">
-                <a16:creationId xmlns:a16="http://schemas.microsoft.com/office/drawing/2014/main" id="{61B81F16-92EE-4A2B-B5D7-8A5E79CBFA5E}"/>
+                <a16:creationId xmlns:a16="http://schemas.microsoft.com/office/drawing/2014/main" id="{595FD241-AF9E-4E28-A46A-63792EBF56C5}"/>
               </a:ext>
             </a:extLst>
           </p:cNvPr>
@@ -7137,54 +7198,57 @@
           <a:p>
             <a:r>
               <a:rPr lang="en-US" dirty="0"/>
-              <a:t>We decided to implement 3 types of client strategies evaluating the proposals in a different manner considering their preferences.</a:t>
-            </a:r>
-          </a:p>
-          <a:p>
-            <a:r>
-              <a:rPr lang="en-US" dirty="0"/>
-              <a:t>The 3 client types are:</a:t>
-            </a:r>
-          </a:p>
-          <a:p>
-            <a:pPr marL="36900" indent="0">
-              <a:buNone/>
-            </a:pPr>
-            <a:r>
-              <a:rPr lang="en-US" dirty="0"/>
-              <a:t>		- Cost focused:  attributes all proposal value to the cost of the delivery, disregarding delivery time.</a:t>
-            </a:r>
-          </a:p>
-          <a:p>
-            <a:pPr marL="36900" indent="0">
-              <a:buNone/>
-            </a:pPr>
-            <a:r>
-              <a:rPr lang="en-US" dirty="0"/>
-              <a:t>		- Time focused:  attributes all proposal value to the time that it takes to conclude the delivery, disregarding delivery cost.</a:t>
-            </a:r>
-          </a:p>
-          <a:p>
-            <a:pPr marL="36900" indent="0">
-              <a:buNone/>
-            </a:pPr>
-            <a:r>
-              <a:rPr lang="en-US" dirty="0"/>
-              <a:t>		- Balanced: Attributes similar value to both parameters.</a:t>
-            </a:r>
-          </a:p>
-          <a:p>
-            <a:pPr marL="36900" indent="0">
-              <a:buNone/>
-            </a:pPr>
-            <a:endParaRPr lang="en-US" dirty="0"/>
+              <a:t>There are 2 types of agents in the system.</a:t>
+            </a:r>
+          </a:p>
+          <a:p>
+            <a:pPr lvl="1"/>
+            <a:r>
+              <a:rPr lang="en-US" sz="2000" dirty="0"/>
+              <a:t>Client Agents: </a:t>
+            </a:r>
+          </a:p>
+          <a:p>
+            <a:pPr lvl="2"/>
+            <a:r>
+              <a:rPr lang="en-US" sz="2000" dirty="0"/>
+              <a:t>Creates a request for a pickup order at a restaurant of their choosing.</a:t>
+            </a:r>
+          </a:p>
+          <a:p>
+            <a:pPr lvl="2"/>
+            <a:r>
+              <a:rPr lang="en-US" sz="2000" dirty="0"/>
+              <a:t>Accept or reject a proposal from a delivery agent</a:t>
+            </a:r>
+          </a:p>
+          <a:p>
+            <a:pPr lvl="1"/>
+            <a:r>
+              <a:rPr lang="en-US" sz="2000" dirty="0"/>
+              <a:t>Deliver Agents:</a:t>
+            </a:r>
+          </a:p>
+          <a:p>
+            <a:pPr lvl="2"/>
+            <a:r>
+              <a:rPr lang="en-US" sz="2000" dirty="0"/>
+              <a:t>Receive Requests and calculate offer cost</a:t>
+            </a:r>
+          </a:p>
+          <a:p>
+            <a:pPr lvl="2"/>
+            <a:r>
+              <a:rPr lang="en-US" sz="2000" dirty="0"/>
+              <a:t>Perform the delivery at the cost of fuel and time.</a:t>
+            </a:r>
           </a:p>
         </p:txBody>
       </p:sp>
     </p:spTree>
     <p:extLst>
       <p:ext uri="{BB962C8B-B14F-4D97-AF65-F5344CB8AC3E}">
-        <p14:creationId xmlns:p14="http://schemas.microsoft.com/office/powerpoint/2010/main" val="2024757831"/>
+        <p14:creationId xmlns:p14="http://schemas.microsoft.com/office/powerpoint/2010/main" val="429455231"/>
       </p:ext>
     </p:extLst>
   </p:cSld>
@@ -7216,7 +7280,7 @@
           <p:cNvPr id="2" name="Título 1">
             <a:extLst>
               <a:ext uri="{FF2B5EF4-FFF2-40B4-BE49-F238E27FC236}">
-                <a16:creationId xmlns:a16="http://schemas.microsoft.com/office/drawing/2014/main" id="{D7127988-9B29-43C4-8E1D-69A8FB733F6A}"/>
+                <a16:creationId xmlns:a16="http://schemas.microsoft.com/office/drawing/2014/main" id="{88AEC832-41B1-4EC0-8F45-380FECE96D8C}"/>
               </a:ext>
             </a:extLst>
           </p:cNvPr>
@@ -7234,7 +7298,7 @@
           <a:p>
             <a:r>
               <a:rPr lang="en-US" dirty="0"/>
-              <a:t>Agent Creation </a:t>
+              <a:t>Strategies</a:t>
             </a:r>
           </a:p>
         </p:txBody>
@@ -7244,7 +7308,7 @@
           <p:cNvPr id="3" name="Marcador de Posição de Conteúdo 2">
             <a:extLst>
               <a:ext uri="{FF2B5EF4-FFF2-40B4-BE49-F238E27FC236}">
-                <a16:creationId xmlns:a16="http://schemas.microsoft.com/office/drawing/2014/main" id="{595FD241-AF9E-4E28-A46A-63792EBF56C5}"/>
+                <a16:creationId xmlns:a16="http://schemas.microsoft.com/office/drawing/2014/main" id="{61B81F16-92EE-4A2B-B5D7-8A5E79CBFA5E}"/>
               </a:ext>
             </a:extLst>
           </p:cNvPr>
@@ -7257,17 +7321,49 @@
         </p:nvSpPr>
         <p:spPr/>
         <p:txBody>
-          <a:bodyPr/>
-          <a:lstStyle/>
-          <a:p>
-            <a:endParaRPr lang="en-US" dirty="0"/>
+          <a:bodyPr>
+            <a:normAutofit/>
+          </a:bodyPr>
+          <a:lstStyle/>
+          <a:p>
+            <a:r>
+              <a:rPr lang="en-US" dirty="0"/>
+              <a:t>We decided to implement 3 types of client strategies evaluating the proposals in a different manner considering their preferences.</a:t>
+            </a:r>
+          </a:p>
+          <a:p>
+            <a:r>
+              <a:rPr lang="en-US" dirty="0"/>
+              <a:t>The 3 client types are:</a:t>
+            </a:r>
+          </a:p>
+          <a:p>
+            <a:pPr lvl="1"/>
+            <a:r>
+              <a:rPr lang="en-US" sz="2000" dirty="0"/>
+              <a:t>Cost focused:  attributes all proposal value to the cost of the delivery, disregarding delivery time.</a:t>
+            </a:r>
+          </a:p>
+          <a:p>
+            <a:pPr lvl="1"/>
+            <a:r>
+              <a:rPr lang="en-US" sz="2000" dirty="0"/>
+              <a:t>Time focused:  attributes all proposal value to the time that it takes to conclude the delivery, disregarding delivery cost.</a:t>
+            </a:r>
+          </a:p>
+          <a:p>
+            <a:pPr lvl="1"/>
+            <a:r>
+              <a:rPr lang="en-US" sz="2000" dirty="0"/>
+              <a:t>Balanced: Attributes similar value to both parameters.</a:t>
+            </a:r>
           </a:p>
         </p:txBody>
       </p:sp>
     </p:spTree>
     <p:extLst>
       <p:ext uri="{BB962C8B-B14F-4D97-AF65-F5344CB8AC3E}">
-        <p14:creationId xmlns:p14="http://schemas.microsoft.com/office/powerpoint/2010/main" val="429455231"/>
+        <p14:creationId xmlns:p14="http://schemas.microsoft.com/office/powerpoint/2010/main" val="2024757831"/>
       </p:ext>
     </p:extLst>
   </p:cSld>
@@ -7343,6 +7439,48 @@
           <a:bodyPr/>
           <a:lstStyle/>
           <a:p>
+            <a:r>
+              <a:rPr lang="en-US" dirty="0"/>
+              <a:t>During the development of the project several experiments were made with different number of clients and deliver agents. </a:t>
+            </a:r>
+          </a:p>
+          <a:p>
+            <a:endParaRPr lang="en-US" dirty="0"/>
+          </a:p>
+          <a:p>
+            <a:r>
+              <a:rPr lang="en-US" dirty="0"/>
+              <a:t>Client and delivery agent parameters were also changed:</a:t>
+            </a:r>
+          </a:p>
+          <a:p>
+            <a:pPr lvl="1"/>
+            <a:r>
+              <a:rPr lang="en-US" dirty="0"/>
+              <a:t>Time/Cost preference</a:t>
+            </a:r>
+          </a:p>
+          <a:p>
+            <a:pPr lvl="1"/>
+            <a:r>
+              <a:rPr lang="en-US" dirty="0"/>
+              <a:t>Deliverer travel speed</a:t>
+            </a:r>
+          </a:p>
+          <a:p>
+            <a:pPr lvl="1"/>
+            <a:r>
+              <a:rPr lang="en-US" dirty="0"/>
+              <a:t>Fuel amount</a:t>
+            </a:r>
+          </a:p>
+          <a:p>
+            <a:endParaRPr lang="en-US" dirty="0"/>
+          </a:p>
+          <a:p>
+            <a:pPr marL="36900" indent="0">
+              <a:buNone/>
+            </a:pPr>
             <a:endParaRPr lang="en-US" dirty="0"/>
           </a:p>
         </p:txBody>
@@ -7426,7 +7564,33 @@
           <a:bodyPr/>
           <a:lstStyle/>
           <a:p>
+            <a:r>
+              <a:rPr lang="en-US" dirty="0"/>
+              <a:t>As expected, the more delivery agents the quicker the orders get filled out.</a:t>
+            </a:r>
+          </a:p>
+          <a:p>
             <a:endParaRPr lang="en-US" dirty="0"/>
+          </a:p>
+          <a:p>
+            <a:pPr>
+              <a:lnSpc>
+                <a:spcPct val="150000"/>
+              </a:lnSpc>
+            </a:pPr>
+            <a:r>
+              <a:rPr lang="en-US" dirty="0"/>
+              <a:t>Having more clients ordering with time being minimized and a higher cost causes delivery agents with higher speed to be more requested.</a:t>
+            </a:r>
+          </a:p>
+          <a:p>
+            <a:endParaRPr lang="en-US" dirty="0"/>
+          </a:p>
+          <a:p>
+            <a:r>
+              <a:rPr lang="en-US" dirty="0"/>
+              <a:t>Lower fuel cap prevents deliverers from travelling too far</a:t>
+            </a:r>
           </a:p>
         </p:txBody>
       </p:sp>
@@ -7462,10 +7626,10 @@
       </p:grpSpPr>
       <p:sp>
         <p:nvSpPr>
-          <p:cNvPr id="2" name="Título 1">
+          <p:cNvPr id="2" name="Title 1">
             <a:extLst>
               <a:ext uri="{FF2B5EF4-FFF2-40B4-BE49-F238E27FC236}">
-                <a16:creationId xmlns:a16="http://schemas.microsoft.com/office/drawing/2014/main" id="{AD03724B-A5A5-47BA-9698-32F08F41B050}"/>
+                <a16:creationId xmlns:a16="http://schemas.microsoft.com/office/drawing/2014/main" id="{9BE2BB34-D998-B95E-F92E-9E08C71FB8B6}"/>
               </a:ext>
             </a:extLst>
           </p:cNvPr>
@@ -7473,7 +7637,7 @@
             <a:spLocks noGrp="1"/>
           </p:cNvSpPr>
           <p:nvPr>
-            <p:ph type="ctrTitle"/>
+            <p:ph type="title"/>
           </p:nvPr>
         </p:nvSpPr>
         <p:spPr/>
@@ -7482,19 +7646,18 @@
           <a:lstStyle/>
           <a:p>
             <a:r>
-              <a:rPr lang="pt-PT" dirty="0"/>
-              <a:t>Adicional Slides</a:t>
-            </a:r>
-            <a:endParaRPr lang="en-US" dirty="0"/>
-          </a:p>
-        </p:txBody>
-      </p:sp>
-      <p:sp>
-        <p:nvSpPr>
-          <p:cNvPr id="5" name="Subtítulo 4">
+              <a:rPr lang="en-GB" dirty="0"/>
+              <a:t>Conclusion</a:t>
+            </a:r>
+          </a:p>
+        </p:txBody>
+      </p:sp>
+      <p:sp>
+        <p:nvSpPr>
+          <p:cNvPr id="3" name="Content Placeholder 2">
             <a:extLst>
               <a:ext uri="{FF2B5EF4-FFF2-40B4-BE49-F238E27FC236}">
-                <a16:creationId xmlns:a16="http://schemas.microsoft.com/office/drawing/2014/main" id="{7BE033C7-9916-4847-A559-15F19ABC4319}"/>
+                <a16:creationId xmlns:a16="http://schemas.microsoft.com/office/drawing/2014/main" id="{8E55E6EF-D8E6-4541-1422-3670848D77E6}"/>
               </a:ext>
             </a:extLst>
           </p:cNvPr>
@@ -7502,7 +7665,7 @@
             <a:spLocks noGrp="1"/>
           </p:cNvSpPr>
           <p:nvPr>
-            <p:ph type="subTitle" idx="1"/>
+            <p:ph idx="1"/>
           </p:nvPr>
         </p:nvSpPr>
         <p:spPr/>
@@ -7510,14 +7673,38 @@
           <a:bodyPr/>
           <a:lstStyle/>
           <a:p>
-            <a:endParaRPr lang="en-US"/>
+            <a:pPr>
+              <a:lnSpc>
+                <a:spcPct val="150000"/>
+              </a:lnSpc>
+            </a:pPr>
+            <a:r>
+              <a:rPr lang="en-GB" dirty="0"/>
+              <a:t>Overall this project was completed successfully. By using the Jade framework and the java programming language we were able to simulate a system of food delivery with several agents involved.</a:t>
+            </a:r>
+          </a:p>
+          <a:p>
+            <a:pPr>
+              <a:lnSpc>
+                <a:spcPct val="150000"/>
+              </a:lnSpc>
+            </a:pPr>
+            <a:r>
+              <a:rPr lang="en-GB" dirty="0"/>
+              <a:t>For future work we could improve the share ride feature to allow for a more dynamic allocation of resources. Add restaurant waiting times and scale the problem to different cities</a:t>
+            </a:r>
+            <a:r>
+              <a:rPr lang="en-GB"/>
+              <a:t>/regions.</a:t>
+            </a:r>
+            <a:endParaRPr lang="en-GB" dirty="0"/>
           </a:p>
         </p:txBody>
       </p:sp>
     </p:spTree>
     <p:extLst>
       <p:ext uri="{BB962C8B-B14F-4D97-AF65-F5344CB8AC3E}">
-        <p14:creationId xmlns:p14="http://schemas.microsoft.com/office/powerpoint/2010/main" val="3970367541"/>
+        <p14:creationId xmlns:p14="http://schemas.microsoft.com/office/powerpoint/2010/main" val="2766750294"/>
       </p:ext>
     </p:extLst>
   </p:cSld>

</xml_diff>